<commit_message>
update slide for DevLINK
</commit_message>
<xml_diff>
--- a/Presentations/XNA3DPrimer/XNA 3D Primer.pptx
+++ b/Presentations/XNA3DPrimer/XNA 3D Primer.pptx
@@ -205,7 +205,8 @@
           <a:p>
             <a:fld id="{8C7EA6FC-0676-4AE5-8821-D00970A7E3FA}" type="datetimeFigureOut">
               <a:rPr lang="en-US" smtClean="0"/>
-              <a:t>1/26/2010</a:t>
+              <a:pPr/>
+              <a:t>8/15/2011</a:t>
             </a:fld>
             <a:endParaRPr lang="en-US"/>
           </a:p>
@@ -366,6 +367,7 @@
           <a:p>
             <a:fld id="{B6F7562E-3817-41D9-9D86-C34008DEDCF2}" type="slidenum">
               <a:rPr lang="en-US" smtClean="0"/>
+              <a:pPr/>
               <a:t>‹#›</a:t>
             </a:fld>
             <a:endParaRPr lang="en-US"/>
@@ -541,6 +543,7 @@
           <a:p>
             <a:fld id="{B6F7562E-3817-41D9-9D86-C34008DEDCF2}" type="slidenum">
               <a:rPr lang="en-US" smtClean="0"/>
+              <a:pPr/>
               <a:t>5</a:t>
             </a:fld>
             <a:endParaRPr lang="en-US"/>
@@ -626,6 +629,7 @@
           <a:p>
             <a:fld id="{B6F7562E-3817-41D9-9D86-C34008DEDCF2}" type="slidenum">
               <a:rPr lang="en-US" smtClean="0"/>
+              <a:pPr/>
               <a:t>6</a:t>
             </a:fld>
             <a:endParaRPr lang="en-US"/>
@@ -711,6 +715,7 @@
           <a:p>
             <a:fld id="{B6F7562E-3817-41D9-9D86-C34008DEDCF2}" type="slidenum">
               <a:rPr lang="en-US" smtClean="0"/>
+              <a:pPr/>
               <a:t>7</a:t>
             </a:fld>
             <a:endParaRPr lang="en-US"/>
@@ -796,6 +801,7 @@
           <a:p>
             <a:fld id="{B6F7562E-3817-41D9-9D86-C34008DEDCF2}" type="slidenum">
               <a:rPr lang="en-US" smtClean="0"/>
+              <a:pPr/>
               <a:t>8</a:t>
             </a:fld>
             <a:endParaRPr lang="en-US"/>
@@ -881,6 +887,7 @@
           <a:p>
             <a:fld id="{B6F7562E-3817-41D9-9D86-C34008DEDCF2}" type="slidenum">
               <a:rPr lang="en-US" smtClean="0"/>
+              <a:pPr/>
               <a:t>9</a:t>
             </a:fld>
             <a:endParaRPr lang="en-US"/>
@@ -966,6 +973,7 @@
           <a:p>
             <a:fld id="{B6F7562E-3817-41D9-9D86-C34008DEDCF2}" type="slidenum">
               <a:rPr lang="en-US" smtClean="0"/>
+              <a:pPr/>
               <a:t>10</a:t>
             </a:fld>
             <a:endParaRPr lang="en-US"/>
@@ -1051,6 +1059,7 @@
           <a:p>
             <a:fld id="{B6F7562E-3817-41D9-9D86-C34008DEDCF2}" type="slidenum">
               <a:rPr lang="en-US" smtClean="0"/>
+              <a:pPr/>
               <a:t>11</a:t>
             </a:fld>
             <a:endParaRPr lang="en-US"/>
@@ -1136,6 +1145,7 @@
           <a:p>
             <a:fld id="{B6F7562E-3817-41D9-9D86-C34008DEDCF2}" type="slidenum">
               <a:rPr lang="en-US" smtClean="0"/>
+              <a:pPr/>
               <a:t>12</a:t>
             </a:fld>
             <a:endParaRPr lang="en-US"/>
@@ -1221,6 +1231,7 @@
           <a:p>
             <a:fld id="{B6F7562E-3817-41D9-9D86-C34008DEDCF2}" type="slidenum">
               <a:rPr lang="en-US" smtClean="0"/>
+              <a:pPr/>
               <a:t>13</a:t>
             </a:fld>
             <a:endParaRPr lang="en-US"/>
@@ -1416,7 +1427,8 @@
           <a:p>
             <a:fld id="{43E31EED-63AD-42FE-9295-013FE4A3F9B7}" type="datetimeFigureOut">
               <a:rPr lang="en-US" smtClean="0"/>
-              <a:t>1/26/2010</a:t>
+              <a:pPr/>
+              <a:t>8/15/2011</a:t>
             </a:fld>
             <a:endParaRPr lang="en-US"/>
           </a:p>
@@ -1458,6 +1470,7 @@
           <a:p>
             <a:fld id="{05E38524-1463-4034-B444-509189886C3F}" type="slidenum">
               <a:rPr lang="en-US" smtClean="0"/>
+              <a:pPr/>
               <a:t>‹#›</a:t>
             </a:fld>
             <a:endParaRPr lang="en-US"/>
@@ -1581,7 +1594,8 @@
           <a:p>
             <a:fld id="{43E31EED-63AD-42FE-9295-013FE4A3F9B7}" type="datetimeFigureOut">
               <a:rPr lang="en-US" smtClean="0"/>
-              <a:t>1/26/2010</a:t>
+              <a:pPr/>
+              <a:t>8/15/2011</a:t>
             </a:fld>
             <a:endParaRPr lang="en-US"/>
           </a:p>
@@ -1623,6 +1637,7 @@
           <a:p>
             <a:fld id="{05E38524-1463-4034-B444-509189886C3F}" type="slidenum">
               <a:rPr lang="en-US" smtClean="0"/>
+              <a:pPr/>
               <a:t>‹#›</a:t>
             </a:fld>
             <a:endParaRPr lang="en-US"/>
@@ -1756,7 +1771,8 @@
           <a:p>
             <a:fld id="{43E31EED-63AD-42FE-9295-013FE4A3F9B7}" type="datetimeFigureOut">
               <a:rPr lang="en-US" smtClean="0"/>
-              <a:t>1/26/2010</a:t>
+              <a:pPr/>
+              <a:t>8/15/2011</a:t>
             </a:fld>
             <a:endParaRPr lang="en-US"/>
           </a:p>
@@ -1798,6 +1814,7 @@
           <a:p>
             <a:fld id="{05E38524-1463-4034-B444-509189886C3F}" type="slidenum">
               <a:rPr lang="en-US" smtClean="0"/>
+              <a:pPr/>
               <a:t>‹#›</a:t>
             </a:fld>
             <a:endParaRPr lang="en-US"/>
@@ -1921,7 +1938,8 @@
           <a:p>
             <a:fld id="{43E31EED-63AD-42FE-9295-013FE4A3F9B7}" type="datetimeFigureOut">
               <a:rPr lang="en-US" smtClean="0"/>
-              <a:t>1/26/2010</a:t>
+              <a:pPr/>
+              <a:t>8/15/2011</a:t>
             </a:fld>
             <a:endParaRPr lang="en-US"/>
           </a:p>
@@ -1963,6 +1981,7 @@
           <a:p>
             <a:fld id="{05E38524-1463-4034-B444-509189886C3F}" type="slidenum">
               <a:rPr lang="en-US" smtClean="0"/>
+              <a:pPr/>
               <a:t>‹#›</a:t>
             </a:fld>
             <a:endParaRPr lang="en-US"/>
@@ -2162,7 +2181,8 @@
           <a:p>
             <a:fld id="{43E31EED-63AD-42FE-9295-013FE4A3F9B7}" type="datetimeFigureOut">
               <a:rPr lang="en-US" smtClean="0"/>
-              <a:t>1/26/2010</a:t>
+              <a:pPr/>
+              <a:t>8/15/2011</a:t>
             </a:fld>
             <a:endParaRPr lang="en-US"/>
           </a:p>
@@ -2204,6 +2224,7 @@
           <a:p>
             <a:fld id="{05E38524-1463-4034-B444-509189886C3F}" type="slidenum">
               <a:rPr lang="en-US" smtClean="0"/>
+              <a:pPr/>
               <a:t>‹#›</a:t>
             </a:fld>
             <a:endParaRPr lang="en-US"/>
@@ -2445,7 +2466,8 @@
           <a:p>
             <a:fld id="{43E31EED-63AD-42FE-9295-013FE4A3F9B7}" type="datetimeFigureOut">
               <a:rPr lang="en-US" smtClean="0"/>
-              <a:t>1/26/2010</a:t>
+              <a:pPr/>
+              <a:t>8/15/2011</a:t>
             </a:fld>
             <a:endParaRPr lang="en-US"/>
           </a:p>
@@ -2487,6 +2509,7 @@
           <a:p>
             <a:fld id="{05E38524-1463-4034-B444-509189886C3F}" type="slidenum">
               <a:rPr lang="en-US" smtClean="0"/>
+              <a:pPr/>
               <a:t>‹#›</a:t>
             </a:fld>
             <a:endParaRPr lang="en-US"/>
@@ -2862,7 +2885,8 @@
           <a:p>
             <a:fld id="{43E31EED-63AD-42FE-9295-013FE4A3F9B7}" type="datetimeFigureOut">
               <a:rPr lang="en-US" smtClean="0"/>
-              <a:t>1/26/2010</a:t>
+              <a:pPr/>
+              <a:t>8/15/2011</a:t>
             </a:fld>
             <a:endParaRPr lang="en-US"/>
           </a:p>
@@ -2904,6 +2928,7 @@
           <a:p>
             <a:fld id="{05E38524-1463-4034-B444-509189886C3F}" type="slidenum">
               <a:rPr lang="en-US" smtClean="0"/>
+              <a:pPr/>
               <a:t>‹#›</a:t>
             </a:fld>
             <a:endParaRPr lang="en-US"/>
@@ -2975,7 +3000,8 @@
           <a:p>
             <a:fld id="{43E31EED-63AD-42FE-9295-013FE4A3F9B7}" type="datetimeFigureOut">
               <a:rPr lang="en-US" smtClean="0"/>
-              <a:t>1/26/2010</a:t>
+              <a:pPr/>
+              <a:t>8/15/2011</a:t>
             </a:fld>
             <a:endParaRPr lang="en-US"/>
           </a:p>
@@ -3017,6 +3043,7 @@
           <a:p>
             <a:fld id="{05E38524-1463-4034-B444-509189886C3F}" type="slidenum">
               <a:rPr lang="en-US" smtClean="0"/>
+              <a:pPr/>
               <a:t>‹#›</a:t>
             </a:fld>
             <a:endParaRPr lang="en-US"/>
@@ -3065,7 +3092,8 @@
           <a:p>
             <a:fld id="{43E31EED-63AD-42FE-9295-013FE4A3F9B7}" type="datetimeFigureOut">
               <a:rPr lang="en-US" smtClean="0"/>
-              <a:t>1/26/2010</a:t>
+              <a:pPr/>
+              <a:t>8/15/2011</a:t>
             </a:fld>
             <a:endParaRPr lang="en-US"/>
           </a:p>
@@ -3107,6 +3135,7 @@
           <a:p>
             <a:fld id="{05E38524-1463-4034-B444-509189886C3F}" type="slidenum">
               <a:rPr lang="en-US" smtClean="0"/>
+              <a:pPr/>
               <a:t>‹#›</a:t>
             </a:fld>
             <a:endParaRPr lang="en-US"/>
@@ -3337,7 +3366,8 @@
           <a:p>
             <a:fld id="{43E31EED-63AD-42FE-9295-013FE4A3F9B7}" type="datetimeFigureOut">
               <a:rPr lang="en-US" smtClean="0"/>
-              <a:t>1/26/2010</a:t>
+              <a:pPr/>
+              <a:t>8/15/2011</a:t>
             </a:fld>
             <a:endParaRPr lang="en-US"/>
           </a:p>
@@ -3379,6 +3409,7 @@
           <a:p>
             <a:fld id="{05E38524-1463-4034-B444-509189886C3F}" type="slidenum">
               <a:rPr lang="en-US" smtClean="0"/>
+              <a:pPr/>
               <a:t>‹#›</a:t>
             </a:fld>
             <a:endParaRPr lang="en-US"/>
@@ -3585,7 +3616,8 @@
           <a:p>
             <a:fld id="{43E31EED-63AD-42FE-9295-013FE4A3F9B7}" type="datetimeFigureOut">
               <a:rPr lang="en-US" smtClean="0"/>
-              <a:t>1/26/2010</a:t>
+              <a:pPr/>
+              <a:t>8/15/2011</a:t>
             </a:fld>
             <a:endParaRPr lang="en-US"/>
           </a:p>
@@ -3627,6 +3659,7 @@
           <a:p>
             <a:fld id="{05E38524-1463-4034-B444-509189886C3F}" type="slidenum">
               <a:rPr lang="en-US" smtClean="0"/>
+              <a:pPr/>
               <a:t>‹#›</a:t>
             </a:fld>
             <a:endParaRPr lang="en-US"/>
@@ -3793,7 +3826,8 @@
           <a:p>
             <a:fld id="{43E31EED-63AD-42FE-9295-013FE4A3F9B7}" type="datetimeFigureOut">
               <a:rPr lang="en-US" smtClean="0"/>
-              <a:t>1/26/2010</a:t>
+              <a:pPr/>
+              <a:t>8/15/2011</a:t>
             </a:fld>
             <a:endParaRPr lang="en-US"/>
           </a:p>
@@ -3871,6 +3905,7 @@
           <a:p>
             <a:fld id="{05E38524-1463-4034-B444-509189886C3F}" type="slidenum">
               <a:rPr lang="en-US" smtClean="0"/>
+              <a:pPr/>
               <a:t>‹#›</a:t>
             </a:fld>
             <a:endParaRPr lang="en-US"/>
@@ -4149,6 +4184,20 @@
 <file path=ppt/slides/slide1.xml><?xml version="1.0" encoding="utf-8"?>
 <p:sld xmlns:a="http://schemas.openxmlformats.org/drawingml/2006/main" xmlns:r="http://schemas.openxmlformats.org/officeDocument/2006/relationships" xmlns:p="http://schemas.openxmlformats.org/presentationml/2006/main">
   <p:cSld>
+    <p:bg>
+      <p:bgPr>
+        <a:blipFill dpi="0" rotWithShape="1">
+          <a:blip r:embed="rId2" cstate="print">
+            <a:lum/>
+          </a:blip>
+          <a:srcRect/>
+          <a:stretch>
+            <a:fillRect/>
+          </a:stretch>
+        </a:blipFill>
+        <a:effectLst/>
+      </p:bgPr>
+    </p:bg>
     <p:spTree>
       <p:nvGrpSpPr>
         <p:cNvPr id="1" name=""/>
@@ -4182,8 +4231,13 @@
           <a:p>
             <a:r>
               <a:rPr lang="en-US" sz="4400" dirty="0" smtClean="0"/>
-              <a:t>Michael C. Neel, MVP</a:t>
-            </a:r>
+              <a:t>Michael C. </a:t>
+            </a:r>
+            <a:r>
+              <a:rPr lang="en-US" sz="4400" dirty="0" smtClean="0"/>
+              <a:t>Neel</a:t>
+            </a:r>
+            <a:endParaRPr lang="en-US" sz="4400" dirty="0" smtClean="0"/>
           </a:p>
           <a:p>
             <a:r>
@@ -5726,8 +5780,8 @@
         </p:nvSpPr>
         <p:spPr>
           <a:xfrm>
-            <a:off x="1524884" y="2967335"/>
-            <a:ext cx="6094233" cy="1107996"/>
+            <a:off x="1503628" y="2967335"/>
+            <a:ext cx="6136745" cy="1107996"/>
           </a:xfrm>
           <a:prstGeom prst="rect">
             <a:avLst/>
@@ -5760,7 +5814,7 @@
                   </a:outerShdw>
                 </a:effectLst>
               </a:rPr>
-              <a:t>creators.xna.com</a:t>
+              <a:t>create.msdn.com</a:t>
             </a:r>
             <a:endParaRPr lang="en-US" sz="6600" b="0" cap="none" spc="0" dirty="0">
               <a:ln w="18415" cmpd="sng">

</xml_diff>

<commit_message>
added website to slide
</commit_message>
<xml_diff>
--- a/Presentations/XNA3DPrimer/XNA 3D Primer.pptx
+++ b/Presentations/XNA3DPrimer/XNA 3D Primer.pptx
@@ -4231,13 +4231,8 @@
           <a:p>
             <a:r>
               <a:rPr lang="en-US" sz="4400" dirty="0" smtClean="0"/>
-              <a:t>Michael C. </a:t>
-            </a:r>
-            <a:r>
-              <a:rPr lang="en-US" sz="4400" dirty="0" smtClean="0"/>
-              <a:t>Neel</a:t>
-            </a:r>
-            <a:endParaRPr lang="en-US" sz="4400" dirty="0" smtClean="0"/>
+              <a:t>Michael C. Neel</a:t>
+            </a:r>
           </a:p>
           <a:p>
             <a:r>
@@ -5815,6 +5810,92 @@
                 </a:effectLst>
               </a:rPr>
               <a:t>create.msdn.com</a:t>
+            </a:r>
+            <a:endParaRPr lang="en-US" sz="6600" b="0" cap="none" spc="0" dirty="0">
+              <a:ln w="18415" cmpd="sng">
+                <a:solidFill>
+                  <a:srgbClr val="FFFFFF"/>
+                </a:solidFill>
+                <a:prstDash val="solid"/>
+              </a:ln>
+              <a:solidFill>
+                <a:srgbClr val="FFFFFF"/>
+              </a:solidFill>
+              <a:effectLst>
+                <a:outerShdw blurRad="63500" dir="3600000" algn="tl" rotWithShape="0">
+                  <a:srgbClr val="000000">
+                    <a:alpha val="70000"/>
+                  </a:srgbClr>
+                </a:outerShdw>
+              </a:effectLst>
+            </a:endParaRPr>
+          </a:p>
+        </p:txBody>
+      </p:sp>
+      <p:sp>
+        <p:nvSpPr>
+          <p:cNvPr id="4" name="Rectangle 3"/>
+          <p:cNvSpPr/>
+          <p:nvPr/>
+        </p:nvSpPr>
+        <p:spPr>
+          <a:xfrm>
+            <a:off x="2711074" y="4267200"/>
+            <a:ext cx="3721853" cy="1107996"/>
+          </a:xfrm>
+          <a:prstGeom prst="rect">
+            <a:avLst/>
+          </a:prstGeom>
+          <a:noFill/>
+        </p:spPr>
+        <p:txBody>
+          <a:bodyPr wrap="none" lIns="91440" tIns="45720" rIns="91440" bIns="45720">
+            <a:spAutoFit/>
+          </a:bodyPr>
+          <a:lstStyle/>
+          <a:p>
+            <a:pPr algn="ctr"/>
+            <a:r>
+              <a:rPr lang="en-US" sz="6600" dirty="0" smtClean="0">
+                <a:ln w="18415" cmpd="sng">
+                  <a:solidFill>
+                    <a:srgbClr val="FFFFFF"/>
+                  </a:solidFill>
+                  <a:prstDash val="solid"/>
+                </a:ln>
+                <a:solidFill>
+                  <a:srgbClr val="FFFFFF"/>
+                </a:solidFill>
+                <a:effectLst>
+                  <a:outerShdw blurRad="63500" dir="3600000" algn="tl" rotWithShape="0">
+                    <a:srgbClr val="000000">
+                      <a:alpha val="70000"/>
+                    </a:srgbClr>
+                  </a:outerShdw>
+                </a:effectLst>
+              </a:rPr>
+              <a:t>v</a:t>
+            </a:r>
+            <a:r>
+              <a:rPr lang="en-US" sz="6600" b="0" cap="none" spc="0" dirty="0" smtClean="0">
+                <a:ln w="18415" cmpd="sng">
+                  <a:solidFill>
+                    <a:srgbClr val="FFFFFF"/>
+                  </a:solidFill>
+                  <a:prstDash val="solid"/>
+                </a:ln>
+                <a:solidFill>
+                  <a:srgbClr val="FFFFFF"/>
+                </a:solidFill>
+                <a:effectLst>
+                  <a:outerShdw blurRad="63500" dir="3600000" algn="tl" rotWithShape="0">
+                    <a:srgbClr val="000000">
+                      <a:alpha val="70000"/>
+                    </a:srgbClr>
+                  </a:outerShdw>
+                </a:effectLst>
+              </a:rPr>
+              <a:t>inull.com</a:t>
             </a:r>
             <a:endParaRPr lang="en-US" sz="6600" b="0" cap="none" spc="0" dirty="0">
               <a:ln w="18415" cmpd="sng">

</xml_diff>

<commit_message>
added slide notes for devlink
</commit_message>
<xml_diff>
--- a/Presentations/XNA3DPrimer/XNA 3D Primer.pptx
+++ b/Presentations/XNA3DPrimer/XNA 3D Primer.pptx
@@ -5,7 +5,7 @@
     <p:sldMasterId id="2147483684" r:id="rId1"/>
   </p:sldMasterIdLst>
   <p:notesMasterIdLst>
-    <p:notesMasterId r:id="rId16"/>
+    <p:notesMasterId r:id="rId17"/>
   </p:notesMasterIdLst>
   <p:sldIdLst>
     <p:sldId id="256" r:id="rId2"/>
@@ -13,15 +13,16 @@
     <p:sldId id="258" r:id="rId4"/>
     <p:sldId id="259" r:id="rId5"/>
     <p:sldId id="260" r:id="rId6"/>
-    <p:sldId id="261" r:id="rId7"/>
-    <p:sldId id="262" r:id="rId8"/>
-    <p:sldId id="263" r:id="rId9"/>
-    <p:sldId id="264" r:id="rId10"/>
-    <p:sldId id="265" r:id="rId11"/>
-    <p:sldId id="266" r:id="rId12"/>
-    <p:sldId id="267" r:id="rId13"/>
-    <p:sldId id="268" r:id="rId14"/>
-    <p:sldId id="269" r:id="rId15"/>
+    <p:sldId id="270" r:id="rId7"/>
+    <p:sldId id="261" r:id="rId8"/>
+    <p:sldId id="262" r:id="rId9"/>
+    <p:sldId id="263" r:id="rId10"/>
+    <p:sldId id="264" r:id="rId11"/>
+    <p:sldId id="265" r:id="rId12"/>
+    <p:sldId id="266" r:id="rId13"/>
+    <p:sldId id="267" r:id="rId14"/>
+    <p:sldId id="268" r:id="rId15"/>
+    <p:sldId id="269" r:id="rId16"/>
   </p:sldIdLst>
   <p:sldSz cx="9144000" cy="6858000" type="screen4x3"/>
   <p:notesSz cx="6858000" cy="9144000"/>
@@ -206,7 +207,7 @@
             <a:fld id="{8C7EA6FC-0676-4AE5-8821-D00970A7E3FA}" type="datetimeFigureOut">
               <a:rPr lang="en-US" smtClean="0"/>
               <a:pPr/>
-              <a:t>8/15/2011</a:t>
+              <a:t>8/18/2011</a:t>
             </a:fld>
             <a:endParaRPr lang="en-US"/>
           </a:p>
@@ -520,7 +521,41 @@
           <a:p>
             <a:r>
               <a:rPr lang="en-US" dirty="0" smtClean="0"/>
-              <a:t>http://www.flickr.com/photos/rutty/492385781/</a:t>
+              <a:t>http://www.flickr.com/photos/theatrebhs/5610503771/</a:t>
+            </a:r>
+          </a:p>
+          <a:p>
+            <a:endParaRPr lang="en-US" dirty="0" smtClean="0"/>
+          </a:p>
+          <a:p>
+            <a:r>
+              <a:rPr lang="en-US" dirty="0" smtClean="0"/>
+              <a:t>Decimal </a:t>
+            </a:r>
+            <a:r>
+              <a:rPr lang="en-US" dirty="0" err="1" smtClean="0"/>
+              <a:t>vs</a:t>
+            </a:r>
+            <a:r>
+              <a:rPr lang="en-US" dirty="0" smtClean="0"/>
+              <a:t> Float memory storage</a:t>
+            </a:r>
+          </a:p>
+          <a:p>
+            <a:endParaRPr lang="en-US" dirty="0" smtClean="0"/>
+          </a:p>
+          <a:p>
+            <a:r>
+              <a:rPr lang="en-US" dirty="0" smtClean="0"/>
+              <a:t>Decimal </a:t>
+            </a:r>
+            <a:r>
+              <a:rPr lang="en-US" dirty="0" err="1" smtClean="0"/>
+              <a:t>vs</a:t>
+            </a:r>
+            <a:r>
+              <a:rPr lang="en-US" dirty="0" smtClean="0"/>
+              <a:t> Float precision</a:t>
             </a:r>
             <a:endParaRPr lang="en-US" dirty="0"/>
           </a:p>
@@ -545,6 +580,142 @@
               <a:rPr lang="en-US" smtClean="0"/>
               <a:pPr/>
               <a:t>5</a:t>
+            </a:fld>
+            <a:endParaRPr lang="en-US"/>
+          </a:p>
+        </p:txBody>
+      </p:sp>
+    </p:spTree>
+  </p:cSld>
+  <p:clrMapOvr>
+    <a:masterClrMapping/>
+  </p:clrMapOvr>
+</p:notes>
+</file>
+
+<file path=ppt/notesSlides/notesSlide10.xml><?xml version="1.0" encoding="utf-8"?>
+<p:notes xmlns:a="http://schemas.openxmlformats.org/drawingml/2006/main" xmlns:r="http://schemas.openxmlformats.org/officeDocument/2006/relationships" xmlns:p="http://schemas.openxmlformats.org/presentationml/2006/main">
+  <p:cSld>
+    <p:spTree>
+      <p:nvGrpSpPr>
+        <p:cNvPr id="1" name=""/>
+        <p:cNvGrpSpPr/>
+        <p:nvPr/>
+      </p:nvGrpSpPr>
+      <p:grpSpPr>
+        <a:xfrm>
+          <a:off x="0" y="0"/>
+          <a:ext cx="0" cy="0"/>
+          <a:chOff x="0" y="0"/>
+          <a:chExt cx="0" cy="0"/>
+        </a:xfrm>
+      </p:grpSpPr>
+      <p:sp>
+        <p:nvSpPr>
+          <p:cNvPr id="2" name="Slide Image Placeholder 1"/>
+          <p:cNvSpPr>
+            <a:spLocks noGrp="1" noRot="1" noChangeAspect="1"/>
+          </p:cNvSpPr>
+          <p:nvPr>
+            <p:ph type="sldImg"/>
+          </p:nvPr>
+        </p:nvSpPr>
+        <p:spPr/>
+      </p:sp>
+      <p:sp>
+        <p:nvSpPr>
+          <p:cNvPr id="3" name="Notes Placeholder 2"/>
+          <p:cNvSpPr>
+            <a:spLocks noGrp="1"/>
+          </p:cNvSpPr>
+          <p:nvPr>
+            <p:ph type="body" idx="1"/>
+          </p:nvPr>
+        </p:nvSpPr>
+        <p:spPr/>
+        <p:txBody>
+          <a:bodyPr>
+            <a:normAutofit/>
+          </a:bodyPr>
+          <a:lstStyle/>
+          <a:p>
+            <a:r>
+              <a:rPr lang="en-US" dirty="0" smtClean="0"/>
+              <a:t>http://</a:t>
+            </a:r>
+            <a:r>
+              <a:rPr lang="en-US" dirty="0" smtClean="0"/>
+              <a:t>www.flickr.com/photos/subblue/3941924561/</a:t>
+            </a:r>
+          </a:p>
+          <a:p>
+            <a:endParaRPr lang="en-US" dirty="0" smtClean="0"/>
+          </a:p>
+          <a:p>
+            <a:r>
+              <a:rPr lang="en-US" dirty="0" smtClean="0"/>
+              <a:t>Rotation around an</a:t>
+            </a:r>
+            <a:r>
+              <a:rPr lang="en-US" baseline="0" dirty="0" smtClean="0"/>
+              <a:t> axis</a:t>
+            </a:r>
+          </a:p>
+          <a:p>
+            <a:endParaRPr lang="en-US" baseline="0" dirty="0" smtClean="0"/>
+          </a:p>
+          <a:p>
+            <a:r>
+              <a:rPr lang="en-US" baseline="0" dirty="0" err="1" smtClean="0"/>
+              <a:t>Matrix.CreateFromAxisAngle</a:t>
+            </a:r>
+            <a:r>
+              <a:rPr lang="en-US" baseline="0" dirty="0" smtClean="0"/>
+              <a:t> to create</a:t>
+            </a:r>
+          </a:p>
+          <a:p>
+            <a:endParaRPr lang="en-US" baseline="0" dirty="0" smtClean="0"/>
+          </a:p>
+          <a:p>
+            <a:r>
+              <a:rPr lang="en-US" baseline="0" dirty="0" smtClean="0"/>
+              <a:t>Vector3.Transform to use</a:t>
+            </a:r>
+          </a:p>
+          <a:p>
+            <a:endParaRPr lang="en-US" baseline="0" dirty="0" smtClean="0"/>
+          </a:p>
+          <a:p>
+            <a:r>
+              <a:rPr lang="en-US" baseline="0" dirty="0" smtClean="0"/>
+              <a:t>(can cheat on everything above!)</a:t>
+            </a:r>
+          </a:p>
+          <a:p>
+            <a:endParaRPr lang="en-US" dirty="0"/>
+          </a:p>
+        </p:txBody>
+      </p:sp>
+      <p:sp>
+        <p:nvSpPr>
+          <p:cNvPr id="4" name="Slide Number Placeholder 3"/>
+          <p:cNvSpPr>
+            <a:spLocks noGrp="1"/>
+          </p:cNvSpPr>
+          <p:nvPr>
+            <p:ph type="sldNum" sz="quarter" idx="10"/>
+          </p:nvPr>
+        </p:nvSpPr>
+        <p:spPr/>
+        <p:txBody>
+          <a:bodyPr/>
+          <a:lstStyle/>
+          <a:p>
+            <a:fld id="{B6F7562E-3817-41D9-9D86-C34008DEDCF2}" type="slidenum">
+              <a:rPr lang="en-US" smtClean="0"/>
+              <a:pPr/>
+              <a:t>14</a:t>
             </a:fld>
             <a:endParaRPr lang="en-US"/>
           </a:p>
@@ -605,10 +776,23 @@
           <a:lstStyle/>
           <a:p>
             <a:r>
-              <a:rPr lang="en-US" smtClean="0"/>
-              <a:t>http://www.flickr.com/photos/rutty/492385781/</a:t>
-            </a:r>
-            <a:endParaRPr lang="en-US"/>
+              <a:rPr lang="en-US" dirty="0" smtClean="0"/>
+              <a:t>http://www.flickr.com/photos/rutty/492385781</a:t>
+            </a:r>
+            <a:r>
+              <a:rPr lang="en-US" dirty="0" smtClean="0"/>
+              <a:t>/</a:t>
+            </a:r>
+          </a:p>
+          <a:p>
+            <a:endParaRPr lang="en-US" dirty="0" smtClean="0"/>
+          </a:p>
+          <a:p>
+            <a:r>
+              <a:rPr lang="en-US" dirty="0" smtClean="0"/>
+              <a:t>Axis Direction and Rotation</a:t>
+            </a:r>
+            <a:endParaRPr lang="en-US" dirty="0"/>
           </a:p>
         </p:txBody>
       </p:sp>
@@ -692,8 +876,29 @@
           <a:p>
             <a:r>
               <a:rPr lang="en-US" dirty="0" smtClean="0"/>
-              <a:t>http://www.flickr.com/photos/rutty/492385781/</a:t>
-            </a:r>
+              <a:t>http://</a:t>
+            </a:r>
+            <a:r>
+              <a:rPr lang="en-US" dirty="0" smtClean="0"/>
+              <a:t>www.flickr.com/photos/rutty/492385781/</a:t>
+            </a:r>
+          </a:p>
+          <a:p>
+            <a:endParaRPr lang="en-US" dirty="0" smtClean="0"/>
+          </a:p>
+          <a:p>
+            <a:r>
+              <a:rPr lang="en-US" dirty="0" smtClean="0"/>
+              <a:t>4x4</a:t>
+            </a:r>
+          </a:p>
+          <a:p>
+            <a:r>
+              <a:rPr lang="en-US" dirty="0" smtClean="0"/>
+              <a:t>Multiple to Combine</a:t>
+            </a:r>
+          </a:p>
+          <a:p>
             <a:endParaRPr lang="en-US" dirty="0"/>
           </a:p>
         </p:txBody>
@@ -778,7 +983,24 @@
           <a:p>
             <a:r>
               <a:rPr lang="en-US" dirty="0" smtClean="0"/>
-              <a:t>http://www.flickr.com/photos/rutty/492385781/</a:t>
+              <a:t>Http</a:t>
+            </a:r>
+            <a:r>
+              <a:rPr lang="en-US" dirty="0" smtClean="0"/>
+              <a:t>://www.flickr.com/photos/rutty/492385781</a:t>
+            </a:r>
+            <a:r>
+              <a:rPr lang="en-US" dirty="0" smtClean="0"/>
+              <a:t>/</a:t>
+            </a:r>
+          </a:p>
+          <a:p>
+            <a:endParaRPr lang="en-US" dirty="0" smtClean="0"/>
+          </a:p>
+          <a:p>
+            <a:r>
+              <a:rPr lang="en-US" dirty="0" smtClean="0"/>
+              <a:t>All translations take place from 0, 0, 0</a:t>
             </a:r>
             <a:endParaRPr lang="en-US" dirty="0"/>
           </a:p>
@@ -864,7 +1086,81 @@
           <a:p>
             <a:r>
               <a:rPr lang="en-US" dirty="0" smtClean="0"/>
-              <a:t>http://www.flickr.com/photos/rutty/492385781/</a:t>
+              <a:t>http://www.flickr.com/photos/rutty/492385781</a:t>
+            </a:r>
+            <a:r>
+              <a:rPr lang="en-US" dirty="0" smtClean="0"/>
+              <a:t>/</a:t>
+            </a:r>
+          </a:p>
+          <a:p>
+            <a:endParaRPr lang="en-US" dirty="0" smtClean="0"/>
+          </a:p>
+          <a:p>
+            <a:r>
+              <a:rPr lang="en-US" dirty="0" smtClean="0"/>
+              <a:t>Vectors</a:t>
+            </a:r>
+            <a:r>
+              <a:rPr lang="en-US" baseline="0" dirty="0" smtClean="0"/>
+              <a:t> start from 0, 0, 0</a:t>
+            </a:r>
+          </a:p>
+          <a:p>
+            <a:endParaRPr lang="en-US" baseline="0" dirty="0" smtClean="0"/>
+          </a:p>
+          <a:p>
+            <a:r>
+              <a:rPr lang="en-US" baseline="0" dirty="0" smtClean="0"/>
+              <a:t>Adding with Head to Tail Rule: vector b head at vector a tail</a:t>
+            </a:r>
+          </a:p>
+          <a:p>
+            <a:endParaRPr lang="en-US" dirty="0" smtClean="0"/>
+          </a:p>
+          <a:p>
+            <a:r>
+              <a:rPr lang="en-US" dirty="0" smtClean="0"/>
+              <a:t>Subtract by adding inverse</a:t>
+            </a:r>
+            <a:r>
+              <a:rPr lang="en-US" baseline="0" dirty="0" smtClean="0"/>
+              <a:t> of the second</a:t>
+            </a:r>
+          </a:p>
+          <a:p>
+            <a:endParaRPr lang="en-US" baseline="0" dirty="0" smtClean="0"/>
+          </a:p>
+          <a:p>
+            <a:r>
+              <a:rPr lang="en-US" baseline="0" dirty="0" smtClean="0"/>
+              <a:t>Use in game: vector a is the player, vector b is the robot, and </a:t>
+            </a:r>
+            <a:r>
+              <a:rPr lang="en-US" baseline="0" dirty="0" err="1" smtClean="0"/>
+              <a:t>a+b</a:t>
+            </a:r>
+            <a:r>
+              <a:rPr lang="en-US" baseline="0" dirty="0" smtClean="0"/>
+              <a:t> is the trajectory of the laser</a:t>
+            </a:r>
+          </a:p>
+          <a:p>
+            <a:endParaRPr lang="en-US" baseline="0" dirty="0" smtClean="0"/>
+          </a:p>
+          <a:p>
+            <a:r>
+              <a:rPr lang="en-US" baseline="0" dirty="0" smtClean="0"/>
+              <a:t>Subtraction is useful for collision – a and b are pool balls, if a-b length is less than the sum of the balls’ radii they have hit (aka bounding sphere) </a:t>
+            </a:r>
+          </a:p>
+          <a:p>
+            <a:endParaRPr lang="en-US" baseline="0" dirty="0" smtClean="0"/>
+          </a:p>
+          <a:p>
+            <a:r>
+              <a:rPr lang="en-US" baseline="0" dirty="0" smtClean="0"/>
+              <a:t>Scale a vector by *</a:t>
             </a:r>
             <a:endParaRPr lang="en-US" dirty="0"/>
           </a:p>
@@ -950,7 +1246,42 @@
           <a:p>
             <a:r>
               <a:rPr lang="en-US" dirty="0" smtClean="0"/>
-              <a:t>http://www.flickr.com/photos/rutty/492385781/</a:t>
+              <a:t>http://</a:t>
+            </a:r>
+            <a:r>
+              <a:rPr lang="en-US" dirty="0" smtClean="0"/>
+              <a:t>www.flickr.com/photos/rutty/492385781/</a:t>
+            </a:r>
+          </a:p>
+          <a:p>
+            <a:endParaRPr lang="en-US" dirty="0" smtClean="0"/>
+          </a:p>
+          <a:p>
+            <a:r>
+              <a:rPr lang="en-US" dirty="0" smtClean="0"/>
+              <a:t>Arc tangent gives</a:t>
+            </a:r>
+            <a:r>
+              <a:rPr lang="en-US" baseline="0" dirty="0" smtClean="0"/>
+              <a:t> the inverse of tangent, and gives the angle of the of the hypotenuse given the ratio of the legs.  2, 4 and -2, -4 have the same ratio (.5) so you must figure the quadrant first.</a:t>
+            </a:r>
+          </a:p>
+          <a:p>
+            <a:endParaRPr lang="en-US" baseline="0" dirty="0" smtClean="0"/>
+          </a:p>
+          <a:p>
+            <a:r>
+              <a:rPr lang="en-US" baseline="0" dirty="0" smtClean="0"/>
+              <a:t>Arctan2 handles this for us</a:t>
+            </a:r>
+          </a:p>
+          <a:p>
+            <a:endParaRPr lang="en-US" baseline="0" dirty="0" smtClean="0"/>
+          </a:p>
+          <a:p>
+            <a:r>
+              <a:rPr lang="en-US" baseline="0" dirty="0" smtClean="0"/>
+              <a:t>Love the radians!</a:t>
             </a:r>
             <a:endParaRPr lang="en-US" dirty="0"/>
           </a:p>
@@ -1036,8 +1367,81 @@
           <a:p>
             <a:r>
               <a:rPr lang="en-US" dirty="0" smtClean="0"/>
-              <a:t>http://www.flickr.com/photos/rutty/492385781/</a:t>
-            </a:r>
+              <a:t>http://</a:t>
+            </a:r>
+            <a:r>
+              <a:rPr lang="en-US" dirty="0" smtClean="0"/>
+              <a:t>www.flickr.com/photos/rutty/492385781/</a:t>
+            </a:r>
+          </a:p>
+          <a:p>
+            <a:endParaRPr lang="en-US" dirty="0" smtClean="0"/>
+          </a:p>
+          <a:p>
+            <a:r>
+              <a:rPr lang="en-US" dirty="0" smtClean="0"/>
+              <a:t>Unit vectors</a:t>
+            </a:r>
+            <a:r>
+              <a:rPr lang="en-US" baseline="0" dirty="0" smtClean="0"/>
+              <a:t> – length = 1</a:t>
+            </a:r>
+          </a:p>
+          <a:p>
+            <a:endParaRPr lang="en-US" baseline="0" dirty="0" smtClean="0"/>
+          </a:p>
+          <a:p>
+            <a:r>
+              <a:rPr lang="en-US" baseline="0" dirty="0" smtClean="0"/>
+              <a:t>Normalize creates a unit vector</a:t>
+            </a:r>
+          </a:p>
+          <a:p>
+            <a:endParaRPr lang="en-US" baseline="0" dirty="0" smtClean="0"/>
+          </a:p>
+          <a:p>
+            <a:r>
+              <a:rPr lang="en-US" baseline="0" dirty="0" smtClean="0"/>
+              <a:t>Dot product *describes* the angle of two vectors, if normalized will be between -1 and 1</a:t>
+            </a:r>
+          </a:p>
+          <a:p>
+            <a:endParaRPr lang="en-US" baseline="0" dirty="0" smtClean="0"/>
+          </a:p>
+          <a:p>
+            <a:r>
+              <a:rPr lang="en-US" baseline="0" dirty="0" smtClean="0"/>
+              <a:t>1 = parallel, same direction</a:t>
+            </a:r>
+          </a:p>
+          <a:p>
+            <a:endParaRPr lang="en-US" baseline="0" dirty="0" smtClean="0"/>
+          </a:p>
+          <a:p>
+            <a:r>
+              <a:rPr lang="en-US" baseline="0" dirty="0" smtClean="0"/>
+              <a:t>-1 = parallel opposite direction</a:t>
+            </a:r>
+          </a:p>
+          <a:p>
+            <a:endParaRPr lang="en-US" baseline="0" dirty="0" smtClean="0"/>
+          </a:p>
+          <a:p>
+            <a:r>
+              <a:rPr lang="en-US" baseline="0" dirty="0" smtClean="0"/>
+              <a:t>0 = right angle</a:t>
+            </a:r>
+          </a:p>
+          <a:p>
+            <a:endParaRPr lang="en-US" baseline="0" dirty="0" smtClean="0"/>
+          </a:p>
+          <a:p>
+            <a:r>
+              <a:rPr lang="en-US" baseline="0" dirty="0" smtClean="0"/>
+              <a:t>Sign also means (+) acute or (-) obtuse</a:t>
+            </a:r>
+          </a:p>
+          <a:p>
             <a:endParaRPr lang="en-US" dirty="0"/>
           </a:p>
         </p:txBody>
@@ -1122,7 +1526,33 @@
           <a:p>
             <a:r>
               <a:rPr lang="en-US" dirty="0" smtClean="0"/>
-              <a:t>http://www.flickr.com/photos/rutty/492385781/</a:t>
+              <a:t>http://www.flickr.com/photos/rutty/492385781</a:t>
+            </a:r>
+            <a:r>
+              <a:rPr lang="en-US" dirty="0" smtClean="0"/>
+              <a:t>/</a:t>
+            </a:r>
+          </a:p>
+          <a:p>
+            <a:endParaRPr lang="en-US" dirty="0" smtClean="0"/>
+          </a:p>
+          <a:p>
+            <a:r>
+              <a:rPr lang="en-US" dirty="0" smtClean="0"/>
+              <a:t>Arc</a:t>
+            </a:r>
+            <a:r>
+              <a:rPr lang="en-US" baseline="0" dirty="0" smtClean="0"/>
+              <a:t> cosine converts a dot product to an angle</a:t>
+            </a:r>
+          </a:p>
+          <a:p>
+            <a:endParaRPr lang="en-US" baseline="0" dirty="0" smtClean="0"/>
+          </a:p>
+          <a:p>
+            <a:r>
+              <a:rPr lang="en-US" baseline="0" dirty="0" smtClean="0"/>
+              <a:t>Dot products describe the angle, but not the direction – d and c are on opposite sides, yet have the same angle…</a:t>
             </a:r>
             <a:endParaRPr lang="en-US" dirty="0"/>
           </a:p>
@@ -1208,7 +1638,55 @@
           <a:p>
             <a:r>
               <a:rPr lang="en-US" dirty="0" smtClean="0"/>
-              <a:t>http://www.flickr.com/photos/subblue/3941924561/</a:t>
+              <a:t>http://</a:t>
+            </a:r>
+            <a:r>
+              <a:rPr lang="en-US" dirty="0" smtClean="0"/>
+              <a:t>www.flickr.com/photos/rutty/492385781/</a:t>
+            </a:r>
+          </a:p>
+          <a:p>
+            <a:endParaRPr lang="en-US" dirty="0" smtClean="0"/>
+          </a:p>
+          <a:p>
+            <a:r>
+              <a:rPr lang="en-US" dirty="0" smtClean="0"/>
+              <a:t>Cross product calculates</a:t>
+            </a:r>
+            <a:r>
+              <a:rPr lang="en-US" baseline="0" dirty="0" smtClean="0"/>
+              <a:t> a vector perpendicular to the two vectors given, using them to describe a plane, also called a normal (not the same as a normalized vector).</a:t>
+            </a:r>
+          </a:p>
+          <a:p>
+            <a:endParaRPr lang="en-US" baseline="0" dirty="0" smtClean="0"/>
+          </a:p>
+          <a:p>
+            <a:r>
+              <a:rPr lang="en-US" baseline="0" dirty="0" err="1" smtClean="0"/>
+              <a:t>Normals</a:t>
+            </a:r>
+            <a:r>
+              <a:rPr lang="en-US" baseline="0" dirty="0" smtClean="0"/>
+              <a:t> used by 3D engine to determine the front, and also the direction lighting should reflect.</a:t>
+            </a:r>
+          </a:p>
+          <a:p>
+            <a:endParaRPr lang="en-US" baseline="0" dirty="0" smtClean="0"/>
+          </a:p>
+          <a:p>
+            <a:r>
+              <a:rPr lang="en-US" baseline="0" dirty="0" smtClean="0"/>
+              <a:t>Cross product also gives a negative or positive value, which can be applied to the angle to have the full picture</a:t>
+            </a:r>
+          </a:p>
+          <a:p>
+            <a:endParaRPr lang="en-US" baseline="0" dirty="0" smtClean="0"/>
+          </a:p>
+          <a:p>
+            <a:r>
+              <a:rPr lang="en-US" baseline="0" dirty="0" smtClean="0"/>
+              <a:t>The last example is the angle to rotate turret b to face player c</a:t>
             </a:r>
             <a:endParaRPr lang="en-US" dirty="0"/>
           </a:p>
@@ -1428,7 +1906,7 @@
             <a:fld id="{43E31EED-63AD-42FE-9295-013FE4A3F9B7}" type="datetimeFigureOut">
               <a:rPr lang="en-US" smtClean="0"/>
               <a:pPr/>
-              <a:t>8/15/2011</a:t>
+              <a:t>8/18/2011</a:t>
             </a:fld>
             <a:endParaRPr lang="en-US"/>
           </a:p>
@@ -1595,7 +2073,7 @@
             <a:fld id="{43E31EED-63AD-42FE-9295-013FE4A3F9B7}" type="datetimeFigureOut">
               <a:rPr lang="en-US" smtClean="0"/>
               <a:pPr/>
-              <a:t>8/15/2011</a:t>
+              <a:t>8/18/2011</a:t>
             </a:fld>
             <a:endParaRPr lang="en-US"/>
           </a:p>
@@ -1772,7 +2250,7 @@
             <a:fld id="{43E31EED-63AD-42FE-9295-013FE4A3F9B7}" type="datetimeFigureOut">
               <a:rPr lang="en-US" smtClean="0"/>
               <a:pPr/>
-              <a:t>8/15/2011</a:t>
+              <a:t>8/18/2011</a:t>
             </a:fld>
             <a:endParaRPr lang="en-US"/>
           </a:p>
@@ -1939,7 +2417,7 @@
             <a:fld id="{43E31EED-63AD-42FE-9295-013FE4A3F9B7}" type="datetimeFigureOut">
               <a:rPr lang="en-US" smtClean="0"/>
               <a:pPr/>
-              <a:t>8/15/2011</a:t>
+              <a:t>8/18/2011</a:t>
             </a:fld>
             <a:endParaRPr lang="en-US"/>
           </a:p>
@@ -2182,7 +2660,7 @@
             <a:fld id="{43E31EED-63AD-42FE-9295-013FE4A3F9B7}" type="datetimeFigureOut">
               <a:rPr lang="en-US" smtClean="0"/>
               <a:pPr/>
-              <a:t>8/15/2011</a:t>
+              <a:t>8/18/2011</a:t>
             </a:fld>
             <a:endParaRPr lang="en-US"/>
           </a:p>
@@ -2467,7 +2945,7 @@
             <a:fld id="{43E31EED-63AD-42FE-9295-013FE4A3F9B7}" type="datetimeFigureOut">
               <a:rPr lang="en-US" smtClean="0"/>
               <a:pPr/>
-              <a:t>8/15/2011</a:t>
+              <a:t>8/18/2011</a:t>
             </a:fld>
             <a:endParaRPr lang="en-US"/>
           </a:p>
@@ -2886,7 +3364,7 @@
             <a:fld id="{43E31EED-63AD-42FE-9295-013FE4A3F9B7}" type="datetimeFigureOut">
               <a:rPr lang="en-US" smtClean="0"/>
               <a:pPr/>
-              <a:t>8/15/2011</a:t>
+              <a:t>8/18/2011</a:t>
             </a:fld>
             <a:endParaRPr lang="en-US"/>
           </a:p>
@@ -3001,7 +3479,7 @@
             <a:fld id="{43E31EED-63AD-42FE-9295-013FE4A3F9B7}" type="datetimeFigureOut">
               <a:rPr lang="en-US" smtClean="0"/>
               <a:pPr/>
-              <a:t>8/15/2011</a:t>
+              <a:t>8/18/2011</a:t>
             </a:fld>
             <a:endParaRPr lang="en-US"/>
           </a:p>
@@ -3093,7 +3571,7 @@
             <a:fld id="{43E31EED-63AD-42FE-9295-013FE4A3F9B7}" type="datetimeFigureOut">
               <a:rPr lang="en-US" smtClean="0"/>
               <a:pPr/>
-              <a:t>8/15/2011</a:t>
+              <a:t>8/18/2011</a:t>
             </a:fld>
             <a:endParaRPr lang="en-US"/>
           </a:p>
@@ -3367,7 +3845,7 @@
             <a:fld id="{43E31EED-63AD-42FE-9295-013FE4A3F9B7}" type="datetimeFigureOut">
               <a:rPr lang="en-US" smtClean="0"/>
               <a:pPr/>
-              <a:t>8/15/2011</a:t>
+              <a:t>8/18/2011</a:t>
             </a:fld>
             <a:endParaRPr lang="en-US"/>
           </a:p>
@@ -3617,7 +4095,7 @@
             <a:fld id="{43E31EED-63AD-42FE-9295-013FE4A3F9B7}" type="datetimeFigureOut">
               <a:rPr lang="en-US" smtClean="0"/>
               <a:pPr/>
-              <a:t>8/15/2011</a:t>
+              <a:t>8/18/2011</a:t>
             </a:fld>
             <a:endParaRPr lang="en-US"/>
           </a:p>
@@ -3827,7 +4305,7 @@
             <a:fld id="{43E31EED-63AD-42FE-9295-013FE4A3F9B7}" type="datetimeFigureOut">
               <a:rPr lang="en-US" smtClean="0"/>
               <a:pPr/>
-              <a:t>8/15/2011</a:t>
+              <a:t>8/18/2011</a:t>
             </a:fld>
             <a:endParaRPr lang="en-US"/>
           </a:p>
@@ -4366,6 +4844,168 @@
         <p:spPr>
           <a:xfrm>
             <a:off x="0" y="0"/>
+            <a:ext cx="7291035" cy="830997"/>
+          </a:xfrm>
+          <a:prstGeom prst="rect">
+            <a:avLst/>
+          </a:prstGeom>
+          <a:noFill/>
+        </p:spPr>
+        <p:txBody>
+          <a:bodyPr wrap="none" lIns="91440" tIns="45720" rIns="91440" bIns="45720">
+            <a:spAutoFit/>
+          </a:bodyPr>
+          <a:lstStyle/>
+          <a:p>
+            <a:pPr algn="ctr"/>
+            <a:r>
+              <a:rPr lang="en-US" sz="4800" dirty="0" smtClean="0">
+                <a:ln w="18415" cmpd="sng">
+                  <a:solidFill>
+                    <a:srgbClr val="FFFFFF"/>
+                  </a:solidFill>
+                  <a:prstDash val="solid"/>
+                </a:ln>
+                <a:solidFill>
+                  <a:srgbClr val="FFFFFF"/>
+                </a:solidFill>
+                <a:effectLst>
+                  <a:outerShdw blurRad="63500" dir="3600000" algn="tl" rotWithShape="0">
+                    <a:srgbClr val="000000">
+                      <a:alpha val="70000"/>
+                    </a:srgbClr>
+                  </a:outerShdw>
+                </a:effectLst>
+              </a:rPr>
+              <a:t>3D Math – Build a better Arc</a:t>
+            </a:r>
+            <a:endParaRPr lang="en-US" sz="4800" b="0" cap="none" spc="0" dirty="0">
+              <a:ln w="18415" cmpd="sng">
+                <a:solidFill>
+                  <a:srgbClr val="FFFFFF"/>
+                </a:solidFill>
+                <a:prstDash val="solid"/>
+              </a:ln>
+              <a:solidFill>
+                <a:srgbClr val="FFFFFF"/>
+              </a:solidFill>
+              <a:effectLst>
+                <a:outerShdw blurRad="63500" dir="3600000" algn="tl" rotWithShape="0">
+                  <a:srgbClr val="000000">
+                    <a:alpha val="70000"/>
+                  </a:srgbClr>
+                </a:outerShdw>
+              </a:effectLst>
+            </a:endParaRPr>
+          </a:p>
+        </p:txBody>
+      </p:sp>
+      <p:sp>
+        <p:nvSpPr>
+          <p:cNvPr id="7" name="TextBox 6"/>
+          <p:cNvSpPr txBox="1"/>
+          <p:nvPr/>
+        </p:nvSpPr>
+        <p:spPr>
+          <a:xfrm>
+            <a:off x="990600" y="2286000"/>
+            <a:ext cx="7315200" cy="3046988"/>
+          </a:xfrm>
+          <a:prstGeom prst="rect">
+            <a:avLst/>
+          </a:prstGeom>
+          <a:noFill/>
+        </p:spPr>
+        <p:txBody>
+          <a:bodyPr wrap="square" rtlCol="0">
+            <a:spAutoFit/>
+          </a:bodyPr>
+          <a:lstStyle/>
+          <a:p>
+            <a:r>
+              <a:rPr lang="en-US" sz="4000" b="1" dirty="0" smtClean="0"/>
+              <a:t>Arctangent2 – Math.Atan2</a:t>
+            </a:r>
+          </a:p>
+          <a:p>
+            <a:endParaRPr lang="en-US" sz="2400" dirty="0"/>
+          </a:p>
+          <a:p>
+            <a:r>
+              <a:rPr lang="fi-FI" sz="3200" dirty="0" smtClean="0">
+                <a:latin typeface="Courier New" pitchFamily="49" charset="0"/>
+                <a:cs typeface="Courier New" pitchFamily="49" charset="0"/>
+              </a:rPr>
+              <a:t>Math.Atan2( 2.0, 4.0)</a:t>
+            </a:r>
+          </a:p>
+          <a:p>
+            <a:r>
+              <a:rPr lang="fi-FI" sz="3200" dirty="0" smtClean="0">
+                <a:latin typeface="Courier New" pitchFamily="49" charset="0"/>
+                <a:cs typeface="Courier New" pitchFamily="49" charset="0"/>
+              </a:rPr>
+              <a:t>  0.46364760900080609</a:t>
+            </a:r>
+          </a:p>
+          <a:p>
+            <a:r>
+              <a:rPr lang="fi-FI" sz="3200" dirty="0" smtClean="0">
+                <a:latin typeface="Courier New" pitchFamily="49" charset="0"/>
+                <a:cs typeface="Courier New" pitchFamily="49" charset="0"/>
+              </a:rPr>
+              <a:t>Math.Atan2( -2.0, -4.0)</a:t>
+            </a:r>
+          </a:p>
+          <a:p>
+            <a:r>
+              <a:rPr lang="fi-FI" sz="3200" dirty="0" smtClean="0">
+                <a:latin typeface="Courier New" pitchFamily="49" charset="0"/>
+                <a:cs typeface="Courier New" pitchFamily="49" charset="0"/>
+              </a:rPr>
+              <a:t>  -2.677945044588987</a:t>
+            </a:r>
+            <a:endParaRPr lang="en-US" sz="3200" dirty="0">
+              <a:latin typeface="Courier New" pitchFamily="49" charset="0"/>
+              <a:cs typeface="Courier New" pitchFamily="49" charset="0"/>
+            </a:endParaRPr>
+          </a:p>
+        </p:txBody>
+      </p:sp>
+    </p:spTree>
+  </p:cSld>
+  <p:clrMapOvr>
+    <a:masterClrMapping/>
+  </p:clrMapOvr>
+</p:sld>
+</file>
+
+<file path=ppt/slides/slide11.xml><?xml version="1.0" encoding="utf-8"?>
+<p:sld xmlns:a="http://schemas.openxmlformats.org/drawingml/2006/main" xmlns:r="http://schemas.openxmlformats.org/officeDocument/2006/relationships" xmlns:p="http://schemas.openxmlformats.org/presentationml/2006/main">
+  <p:cSld>
+    <p:spTree>
+      <p:nvGrpSpPr>
+        <p:cNvPr id="1" name=""/>
+        <p:cNvGrpSpPr/>
+        <p:nvPr/>
+      </p:nvGrpSpPr>
+      <p:grpSpPr>
+        <a:xfrm>
+          <a:off x="0" y="0"/>
+          <a:ext cx="0" cy="0"/>
+          <a:chOff x="0" y="0"/>
+          <a:chExt cx="0" cy="0"/>
+        </a:xfrm>
+      </p:grpSpPr>
+      <p:sp>
+        <p:nvSpPr>
+          <p:cNvPr id="2" name="Rectangle 1"/>
+          <p:cNvSpPr/>
+          <p:nvPr/>
+        </p:nvSpPr>
+        <p:spPr>
+          <a:xfrm>
+            <a:off x="0" y="0"/>
             <a:ext cx="2360646" cy="830997"/>
           </a:xfrm>
           <a:prstGeom prst="rect">
@@ -4682,7 +5322,7 @@
 </p:sld>
 </file>
 
-<file path=ppt/slides/slide11.xml><?xml version="1.0" encoding="utf-8"?>
+<file path=ppt/slides/slide12.xml><?xml version="1.0" encoding="utf-8"?>
 <p:sld xmlns:a="http://schemas.openxmlformats.org/drawingml/2006/main" xmlns:r="http://schemas.openxmlformats.org/officeDocument/2006/relationships" xmlns:p="http://schemas.openxmlformats.org/presentationml/2006/main">
   <p:cSld>
     <p:spTree>
@@ -5079,7 +5719,7 @@
 </p:sld>
 </file>
 
-<file path=ppt/slides/slide12.xml><?xml version="1.0" encoding="utf-8"?>
+<file path=ppt/slides/slide13.xml><?xml version="1.0" encoding="utf-8"?>
 <p:sld xmlns:a="http://schemas.openxmlformats.org/drawingml/2006/main" xmlns:r="http://schemas.openxmlformats.org/officeDocument/2006/relationships" xmlns:p="http://schemas.openxmlformats.org/presentationml/2006/main">
   <p:cSld>
     <p:spTree>
@@ -5365,7 +6005,7 @@
 </p:sld>
 </file>
 
-<file path=ppt/slides/slide13.xml><?xml version="1.0" encoding="utf-8"?>
+<file path=ppt/slides/slide14.xml><?xml version="1.0" encoding="utf-8"?>
 <p:sld xmlns:a="http://schemas.openxmlformats.org/drawingml/2006/main" xmlns:r="http://schemas.openxmlformats.org/officeDocument/2006/relationships" xmlns:p="http://schemas.openxmlformats.org/presentationml/2006/main">
   <p:cSld>
     <p:spTree>
@@ -5552,7 +6192,7 @@
 </p:sld>
 </file>
 
-<file path=ppt/slides/slide14.xml><?xml version="1.0" encoding="utf-8"?>
+<file path=ppt/slides/slide15.xml><?xml version="1.0" encoding="utf-8"?>
 <p:sld xmlns:a="http://schemas.openxmlformats.org/drawingml/2006/main" xmlns:r="http://schemas.openxmlformats.org/officeDocument/2006/relationships" xmlns:p="http://schemas.openxmlformats.org/presentationml/2006/main">
   <p:cSld>
     <p:spTree>
@@ -5569,6 +6209,103 @@
           <a:chExt cx="0" cy="0"/>
         </a:xfrm>
       </p:grpSpPr>
+      <p:pic>
+        <p:nvPicPr>
+          <p:cNvPr id="2050" name="Picture 2"/>
+          <p:cNvPicPr>
+            <a:picLocks noChangeAspect="1" noChangeArrowheads="1"/>
+          </p:cNvPicPr>
+          <p:nvPr/>
+        </p:nvPicPr>
+        <p:blipFill>
+          <a:blip r:embed="rId2" cstate="print"/>
+          <a:srcRect/>
+          <a:stretch>
+            <a:fillRect/>
+          </a:stretch>
+        </p:blipFill>
+        <p:spPr bwMode="auto">
+          <a:xfrm>
+            <a:off x="2190750" y="1752600"/>
+            <a:ext cx="4762500" cy="2571750"/>
+          </a:xfrm>
+          <a:prstGeom prst="rect">
+            <a:avLst/>
+          </a:prstGeom>
+          <a:noFill/>
+          <a:ln w="9525">
+            <a:noFill/>
+            <a:miter lim="800000"/>
+            <a:headEnd/>
+            <a:tailEnd/>
+          </a:ln>
+        </p:spPr>
+      </p:pic>
+      <p:sp>
+        <p:nvSpPr>
+          <p:cNvPr id="3" name="Rectangle 2"/>
+          <p:cNvSpPr/>
+          <p:nvPr/>
+        </p:nvSpPr>
+        <p:spPr>
+          <a:xfrm>
+            <a:off x="608104" y="4800600"/>
+            <a:ext cx="7859652" cy="1200329"/>
+          </a:xfrm>
+          <a:prstGeom prst="rect">
+            <a:avLst/>
+          </a:prstGeom>
+          <a:noFill/>
+        </p:spPr>
+        <p:txBody>
+          <a:bodyPr wrap="none" lIns="91440" tIns="45720" rIns="91440" bIns="45720">
+            <a:spAutoFit/>
+          </a:bodyPr>
+          <a:lstStyle/>
+          <a:p>
+            <a:pPr algn="ctr"/>
+            <a:r>
+              <a:rPr lang="en-US" sz="7200" b="1" cap="none" spc="0" dirty="0" smtClean="0">
+                <a:ln w="18415" cmpd="sng">
+                  <a:solidFill>
+                    <a:srgbClr val="FFFFFF"/>
+                  </a:solidFill>
+                  <a:prstDash val="solid"/>
+                </a:ln>
+                <a:solidFill>
+                  <a:srgbClr val="FFFFFF"/>
+                </a:solidFill>
+                <a:effectLst>
+                  <a:outerShdw blurRad="63500" dir="3600000" algn="tl" rotWithShape="0">
+                    <a:srgbClr val="000000">
+                      <a:alpha val="70000"/>
+                    </a:srgbClr>
+                  </a:outerShdw>
+                </a:effectLst>
+              </a:rPr>
+              <a:t>Show Me The Code!</a:t>
+            </a:r>
+            <a:endParaRPr lang="en-US" sz="7200" b="1" cap="none" spc="0" dirty="0">
+              <a:ln w="18415" cmpd="sng">
+                <a:solidFill>
+                  <a:srgbClr val="FFFFFF"/>
+                </a:solidFill>
+                <a:prstDash val="solid"/>
+              </a:ln>
+              <a:solidFill>
+                <a:srgbClr val="FFFFFF"/>
+              </a:solidFill>
+              <a:effectLst>
+                <a:outerShdw blurRad="63500" dir="3600000" algn="tl" rotWithShape="0">
+                  <a:srgbClr val="000000">
+                    <a:alpha val="70000"/>
+                  </a:srgbClr>
+                </a:outerShdw>
+              </a:effectLst>
+            </a:endParaRPr>
+          </a:p>
+        </p:txBody>
+      </p:sp>
     </p:spTree>
   </p:cSld>
   <p:clrMapOvr>
@@ -6098,6 +6835,159 @@
           </a:p>
         </p:txBody>
       </p:sp>
+      <p:sp>
+        <p:nvSpPr>
+          <p:cNvPr id="4" name="TextBox 3"/>
+          <p:cNvSpPr txBox="1"/>
+          <p:nvPr/>
+        </p:nvSpPr>
+        <p:spPr>
+          <a:xfrm>
+            <a:off x="477738" y="5478959"/>
+            <a:ext cx="8188524" cy="707886"/>
+          </a:xfrm>
+          <a:prstGeom prst="rect">
+            <a:avLst/>
+          </a:prstGeom>
+          <a:noFill/>
+        </p:spPr>
+        <p:txBody>
+          <a:bodyPr wrap="none" rtlCol="0">
+            <a:spAutoFit/>
+          </a:bodyPr>
+          <a:lstStyle/>
+          <a:p>
+            <a:pPr algn="ctr"/>
+            <a:r>
+              <a:rPr lang="en-US" sz="4000" dirty="0" smtClean="0"/>
+              <a:t>Decimals, Doubles, and Floats, Oh My!</a:t>
+            </a:r>
+            <a:endParaRPr lang="en-US" sz="4000" dirty="0"/>
+          </a:p>
+        </p:txBody>
+      </p:sp>
+      <p:pic>
+        <p:nvPicPr>
+          <p:cNvPr id="1026" name="Picture 2"/>
+          <p:cNvPicPr>
+            <a:picLocks noChangeAspect="1" noChangeArrowheads="1"/>
+          </p:cNvPicPr>
+          <p:nvPr/>
+        </p:nvPicPr>
+        <p:blipFill>
+          <a:blip r:embed="rId3" cstate="print"/>
+          <a:srcRect/>
+          <a:stretch>
+            <a:fillRect/>
+          </a:stretch>
+        </p:blipFill>
+        <p:spPr bwMode="auto">
+          <a:xfrm>
+            <a:off x="1524000" y="1028700"/>
+            <a:ext cx="6096000" cy="4076700"/>
+          </a:xfrm>
+          <a:prstGeom prst="rect">
+            <a:avLst/>
+          </a:prstGeom>
+          <a:noFill/>
+          <a:ln w="9525">
+            <a:noFill/>
+            <a:miter lim="800000"/>
+            <a:headEnd/>
+            <a:tailEnd/>
+          </a:ln>
+        </p:spPr>
+      </p:pic>
+    </p:spTree>
+  </p:cSld>
+  <p:clrMapOvr>
+    <a:masterClrMapping/>
+  </p:clrMapOvr>
+</p:sld>
+</file>
+
+<file path=ppt/slides/slide6.xml><?xml version="1.0" encoding="utf-8"?>
+<p:sld xmlns:a="http://schemas.openxmlformats.org/drawingml/2006/main" xmlns:r="http://schemas.openxmlformats.org/officeDocument/2006/relationships" xmlns:p="http://schemas.openxmlformats.org/presentationml/2006/main">
+  <p:cSld>
+    <p:spTree>
+      <p:nvGrpSpPr>
+        <p:cNvPr id="1" name=""/>
+        <p:cNvGrpSpPr/>
+        <p:nvPr/>
+      </p:nvGrpSpPr>
+      <p:grpSpPr>
+        <a:xfrm>
+          <a:off x="0" y="0"/>
+          <a:ext cx="0" cy="0"/>
+          <a:chOff x="0" y="0"/>
+          <a:chExt cx="0" cy="0"/>
+        </a:xfrm>
+      </p:grpSpPr>
+      <p:sp>
+        <p:nvSpPr>
+          <p:cNvPr id="2" name="Rectangle 1"/>
+          <p:cNvSpPr/>
+          <p:nvPr/>
+        </p:nvSpPr>
+        <p:spPr>
+          <a:xfrm>
+            <a:off x="0" y="0"/>
+            <a:ext cx="2360646" cy="830997"/>
+          </a:xfrm>
+          <a:prstGeom prst="rect">
+            <a:avLst/>
+          </a:prstGeom>
+          <a:noFill/>
+        </p:spPr>
+        <p:txBody>
+          <a:bodyPr wrap="none" lIns="91440" tIns="45720" rIns="91440" bIns="45720">
+            <a:spAutoFit/>
+          </a:bodyPr>
+          <a:lstStyle/>
+          <a:p>
+            <a:pPr algn="ctr"/>
+            <a:r>
+              <a:rPr lang="en-US" sz="4800" dirty="0" smtClean="0">
+                <a:ln w="18415" cmpd="sng">
+                  <a:solidFill>
+                    <a:srgbClr val="FFFFFF"/>
+                  </a:solidFill>
+                  <a:prstDash val="solid"/>
+                </a:ln>
+                <a:solidFill>
+                  <a:srgbClr val="FFFFFF"/>
+                </a:solidFill>
+                <a:effectLst>
+                  <a:outerShdw blurRad="63500" dir="3600000" algn="tl" rotWithShape="0">
+                    <a:srgbClr val="000000">
+                      <a:alpha val="70000"/>
+                    </a:srgbClr>
+                  </a:outerShdw>
+                </a:effectLst>
+              </a:rPr>
+              <a:t>3D Math</a:t>
+            </a:r>
+            <a:endParaRPr lang="en-US" sz="4800" b="0" cap="none" spc="0" dirty="0">
+              <a:ln w="18415" cmpd="sng">
+                <a:solidFill>
+                  <a:srgbClr val="FFFFFF"/>
+                </a:solidFill>
+                <a:prstDash val="solid"/>
+              </a:ln>
+              <a:solidFill>
+                <a:srgbClr val="FFFFFF"/>
+              </a:solidFill>
+              <a:effectLst>
+                <a:outerShdw blurRad="63500" dir="3600000" algn="tl" rotWithShape="0">
+                  <a:srgbClr val="000000">
+                    <a:alpha val="70000"/>
+                  </a:srgbClr>
+                </a:outerShdw>
+              </a:effectLst>
+            </a:endParaRPr>
+          </a:p>
+        </p:txBody>
+      </p:sp>
       <p:pic>
         <p:nvPicPr>
           <p:cNvPr id="3074" name="Picture 2"/>
@@ -6168,7 +7058,7 @@
 </p:sld>
 </file>
 
-<file path=ppt/slides/slide6.xml><?xml version="1.0" encoding="utf-8"?>
+<file path=ppt/slides/slide7.xml><?xml version="1.0" encoding="utf-8"?>
 <p:sld xmlns:a="http://schemas.openxmlformats.org/drawingml/2006/main" xmlns:r="http://schemas.openxmlformats.org/officeDocument/2006/relationships" xmlns:p="http://schemas.openxmlformats.org/presentationml/2006/main">
   <p:cSld>
     <p:spTree>
@@ -6499,7 +7389,7 @@
 </p:sld>
 </file>
 
-<file path=ppt/slides/slide7.xml><?xml version="1.0" encoding="utf-8"?>
+<file path=ppt/slides/slide8.xml><?xml version="1.0" encoding="utf-8"?>
 <p:sld xmlns:a="http://schemas.openxmlformats.org/drawingml/2006/main" xmlns:r="http://schemas.openxmlformats.org/officeDocument/2006/relationships" xmlns:p="http://schemas.openxmlformats.org/presentationml/2006/main">
   <p:cSld>
     <p:spTree>
@@ -6673,7 +7563,7 @@
 </p:sld>
 </file>
 
-<file path=ppt/slides/slide8.xml><?xml version="1.0" encoding="utf-8"?>
+<file path=ppt/slides/slide9.xml><?xml version="1.0" encoding="utf-8"?>
 <p:sld xmlns:a="http://schemas.openxmlformats.org/drawingml/2006/main" xmlns:r="http://schemas.openxmlformats.org/officeDocument/2006/relationships" xmlns:p="http://schemas.openxmlformats.org/presentationml/2006/main">
   <p:cSld>
     <p:spTree>
@@ -6856,168 +7746,6 @@
           </a:ln>
         </p:spPr>
       </p:pic>
-    </p:spTree>
-  </p:cSld>
-  <p:clrMapOvr>
-    <a:masterClrMapping/>
-  </p:clrMapOvr>
-</p:sld>
-</file>
-
-<file path=ppt/slides/slide9.xml><?xml version="1.0" encoding="utf-8"?>
-<p:sld xmlns:a="http://schemas.openxmlformats.org/drawingml/2006/main" xmlns:r="http://schemas.openxmlformats.org/officeDocument/2006/relationships" xmlns:p="http://schemas.openxmlformats.org/presentationml/2006/main">
-  <p:cSld>
-    <p:spTree>
-      <p:nvGrpSpPr>
-        <p:cNvPr id="1" name=""/>
-        <p:cNvGrpSpPr/>
-        <p:nvPr/>
-      </p:nvGrpSpPr>
-      <p:grpSpPr>
-        <a:xfrm>
-          <a:off x="0" y="0"/>
-          <a:ext cx="0" cy="0"/>
-          <a:chOff x="0" y="0"/>
-          <a:chExt cx="0" cy="0"/>
-        </a:xfrm>
-      </p:grpSpPr>
-      <p:sp>
-        <p:nvSpPr>
-          <p:cNvPr id="2" name="Rectangle 1"/>
-          <p:cNvSpPr/>
-          <p:nvPr/>
-        </p:nvSpPr>
-        <p:spPr>
-          <a:xfrm>
-            <a:off x="0" y="0"/>
-            <a:ext cx="7291035" cy="830997"/>
-          </a:xfrm>
-          <a:prstGeom prst="rect">
-            <a:avLst/>
-          </a:prstGeom>
-          <a:noFill/>
-        </p:spPr>
-        <p:txBody>
-          <a:bodyPr wrap="none" lIns="91440" tIns="45720" rIns="91440" bIns="45720">
-            <a:spAutoFit/>
-          </a:bodyPr>
-          <a:lstStyle/>
-          <a:p>
-            <a:pPr algn="ctr"/>
-            <a:r>
-              <a:rPr lang="en-US" sz="4800" dirty="0" smtClean="0">
-                <a:ln w="18415" cmpd="sng">
-                  <a:solidFill>
-                    <a:srgbClr val="FFFFFF"/>
-                  </a:solidFill>
-                  <a:prstDash val="solid"/>
-                </a:ln>
-                <a:solidFill>
-                  <a:srgbClr val="FFFFFF"/>
-                </a:solidFill>
-                <a:effectLst>
-                  <a:outerShdw blurRad="63500" dir="3600000" algn="tl" rotWithShape="0">
-                    <a:srgbClr val="000000">
-                      <a:alpha val="70000"/>
-                    </a:srgbClr>
-                  </a:outerShdw>
-                </a:effectLst>
-              </a:rPr>
-              <a:t>3D Math – Build a better Arc</a:t>
-            </a:r>
-            <a:endParaRPr lang="en-US" sz="4800" b="0" cap="none" spc="0" dirty="0">
-              <a:ln w="18415" cmpd="sng">
-                <a:solidFill>
-                  <a:srgbClr val="FFFFFF"/>
-                </a:solidFill>
-                <a:prstDash val="solid"/>
-              </a:ln>
-              <a:solidFill>
-                <a:srgbClr val="FFFFFF"/>
-              </a:solidFill>
-              <a:effectLst>
-                <a:outerShdw blurRad="63500" dir="3600000" algn="tl" rotWithShape="0">
-                  <a:srgbClr val="000000">
-                    <a:alpha val="70000"/>
-                  </a:srgbClr>
-                </a:outerShdw>
-              </a:effectLst>
-            </a:endParaRPr>
-          </a:p>
-        </p:txBody>
-      </p:sp>
-      <p:sp>
-        <p:nvSpPr>
-          <p:cNvPr id="7" name="TextBox 6"/>
-          <p:cNvSpPr txBox="1"/>
-          <p:nvPr/>
-        </p:nvSpPr>
-        <p:spPr>
-          <a:xfrm>
-            <a:off x="990600" y="2286000"/>
-            <a:ext cx="7315200" cy="3046988"/>
-          </a:xfrm>
-          <a:prstGeom prst="rect">
-            <a:avLst/>
-          </a:prstGeom>
-          <a:noFill/>
-        </p:spPr>
-        <p:txBody>
-          <a:bodyPr wrap="square" rtlCol="0">
-            <a:spAutoFit/>
-          </a:bodyPr>
-          <a:lstStyle/>
-          <a:p>
-            <a:r>
-              <a:rPr lang="en-US" sz="4000" b="1" dirty="0" smtClean="0"/>
-              <a:t>Arctangent2 – Math.Atan2</a:t>
-            </a:r>
-          </a:p>
-          <a:p>
-            <a:endParaRPr lang="en-US" sz="2400" dirty="0"/>
-          </a:p>
-          <a:p>
-            <a:r>
-              <a:rPr lang="fi-FI" sz="3200" dirty="0" smtClean="0">
-                <a:latin typeface="Courier New" pitchFamily="49" charset="0"/>
-                <a:cs typeface="Courier New" pitchFamily="49" charset="0"/>
-              </a:rPr>
-              <a:t>Math.Atan2( 2.0, 4.0)</a:t>
-            </a:r>
-          </a:p>
-          <a:p>
-            <a:r>
-              <a:rPr lang="fi-FI" sz="3200" dirty="0" smtClean="0">
-                <a:latin typeface="Courier New" pitchFamily="49" charset="0"/>
-                <a:cs typeface="Courier New" pitchFamily="49" charset="0"/>
-              </a:rPr>
-              <a:t>  0.46364760900080609</a:t>
-            </a:r>
-          </a:p>
-          <a:p>
-            <a:r>
-              <a:rPr lang="fi-FI" sz="3200" dirty="0" smtClean="0">
-                <a:latin typeface="Courier New" pitchFamily="49" charset="0"/>
-                <a:cs typeface="Courier New" pitchFamily="49" charset="0"/>
-              </a:rPr>
-              <a:t>Math.Atan2( -2.0, -4.0)</a:t>
-            </a:r>
-          </a:p>
-          <a:p>
-            <a:r>
-              <a:rPr lang="fi-FI" sz="3200" dirty="0" smtClean="0">
-                <a:latin typeface="Courier New" pitchFamily="49" charset="0"/>
-                <a:cs typeface="Courier New" pitchFamily="49" charset="0"/>
-              </a:rPr>
-              <a:t>  -2.677945044588987</a:t>
-            </a:r>
-            <a:endParaRPr lang="en-US" sz="3200" dirty="0">
-              <a:latin typeface="Courier New" pitchFamily="49" charset="0"/>
-              <a:cs typeface="Courier New" pitchFamily="49" charset="0"/>
-            </a:endParaRPr>
-          </a:p>
-        </p:txBody>
-      </p:sp>
     </p:spTree>
   </p:cSld>
   <p:clrMapOvr>

</xml_diff>